<commit_message>
remove hiperlinks from von Neumann's slide
</commit_message>
<xml_diff>
--- a/Sessions/5/gip5.pptx
+++ b/Sessions/5/gip5.pptx
@@ -14378,34 +14378,12 @@
           </a:p>
           <a:p>
             <a:r>
-              <a:rPr lang="en-US" dirty="0" smtClean="0">
-                <a:hlinkClick r:id="rId2" tooltip="Jewish"/>
-              </a:rPr>
-              <a:t>Jewish</a:t>
-            </a:r>
-            <a:r>
               <a:rPr lang="en-US" dirty="0" smtClean="0"/>
-              <a:t>-born </a:t>
-            </a:r>
-            <a:r>
-              <a:rPr lang="en-US" dirty="0">
-                <a:hlinkClick r:id="rId3" tooltip="Hungary"/>
-              </a:rPr>
-              <a:t>Hungarian</a:t>
+              <a:t>Jewish-born </a:t>
             </a:r>
             <a:r>
               <a:rPr lang="en-US" dirty="0"/>
-              <a:t> and later </a:t>
-            </a:r>
-            <a:r>
-              <a:rPr lang="en-US" dirty="0">
-                <a:hlinkClick r:id="rId4" tooltip="Americans"/>
-              </a:rPr>
-              <a:t>American</a:t>
-            </a:r>
-            <a:r>
-              <a:rPr lang="en-US" dirty="0"/>
-              <a:t> </a:t>
+              <a:t>Hungarian and later American </a:t>
             </a:r>
             <a:endParaRPr lang="en-US" dirty="0" smtClean="0"/>
           </a:p>
@@ -14416,108 +14394,21 @@
             </a:r>
             <a:r>
               <a:rPr lang="en-US" dirty="0"/>
-              <a:t>and applied </a:t>
-            </a:r>
-            <a:r>
-              <a:rPr lang="en-US" dirty="0">
-                <a:hlinkClick r:id="rId5" tooltip="Mathematician"/>
-              </a:rPr>
-              <a:t>mathematician</a:t>
+              <a:t>and applied mathematician, physicist, inventor, polymath, and </a:t>
+            </a:r>
+            <a:r>
+              <a:rPr lang="en-US" dirty="0" smtClean="0"/>
+              <a:t>polyglot</a:t>
+            </a:r>
+          </a:p>
+          <a:p>
+            <a:r>
+              <a:rPr lang="en-US" dirty="0" smtClean="0"/>
+              <a:t>Von </a:t>
             </a:r>
             <a:r>
               <a:rPr lang="en-US" dirty="0"/>
-              <a:t>, </a:t>
-            </a:r>
-            <a:r>
-              <a:rPr lang="en-US" dirty="0">
-                <a:hlinkClick r:id="rId6" tooltip="Physicist"/>
-              </a:rPr>
-              <a:t>physicist</a:t>
-            </a:r>
-            <a:r>
-              <a:rPr lang="en-US" dirty="0"/>
-              <a:t>, </a:t>
-            </a:r>
-            <a:r>
-              <a:rPr lang="en-US" dirty="0">
-                <a:hlinkClick r:id="rId7" tooltip="Inventor"/>
-              </a:rPr>
-              <a:t>inventor</a:t>
-            </a:r>
-            <a:r>
-              <a:rPr lang="en-US" dirty="0"/>
-              <a:t>, </a:t>
-            </a:r>
-            <a:r>
-              <a:rPr lang="en-US" dirty="0">
-                <a:hlinkClick r:id="rId8" tooltip="Polymath"/>
-              </a:rPr>
-              <a:t>polymath</a:t>
-            </a:r>
-            <a:r>
-              <a:rPr lang="en-US" dirty="0"/>
-              <a:t>, and </a:t>
-            </a:r>
-            <a:r>
-              <a:rPr lang="en-US" dirty="0" smtClean="0">
-                <a:hlinkClick r:id="rId9" tooltip="Polyglot"/>
-              </a:rPr>
-              <a:t>polyglot</a:t>
-            </a:r>
-            <a:endParaRPr lang="en-US" dirty="0" smtClean="0"/>
-          </a:p>
-          <a:p>
-            <a:r>
-              <a:rPr lang="en-US" dirty="0" smtClean="0">
-                <a:hlinkClick r:id="rId10" tooltip="Von Neumann architecture"/>
-              </a:rPr>
-              <a:t>Von </a:t>
-            </a:r>
-            <a:r>
-              <a:rPr lang="en-US" dirty="0">
-                <a:hlinkClick r:id="rId10" tooltip="Von Neumann architecture"/>
-              </a:rPr>
-              <a:t>Neumann architecture</a:t>
-            </a:r>
-            <a:r>
-              <a:rPr lang="en-US" dirty="0"/>
-              <a:t>, </a:t>
-            </a:r>
-            <a:r>
-              <a:rPr lang="en-US" dirty="0">
-                <a:hlinkClick r:id="rId11" tooltip="Linear programming"/>
-              </a:rPr>
-              <a:t>linear programming</a:t>
-            </a:r>
-            <a:r>
-              <a:rPr lang="en-US" dirty="0"/>
-              <a:t>, </a:t>
-            </a:r>
-            <a:r>
-              <a:rPr lang="en-US" dirty="0">
-                <a:hlinkClick r:id="rId12" tooltip="Von Neumann universal constructor"/>
-              </a:rPr>
-              <a:t>self-replicating machines</a:t>
-            </a:r>
-            <a:r>
-              <a:rPr lang="en-US" dirty="0"/>
-              <a:t>, </a:t>
-            </a:r>
-            <a:r>
-              <a:rPr lang="en-US" dirty="0">
-                <a:hlinkClick r:id="rId13" tooltip="Stochastic computing"/>
-              </a:rPr>
-              <a:t>stochastic computing</a:t>
-            </a:r>
-            <a:r>
-              <a:rPr lang="en-US" dirty="0"/>
-              <a:t>), and </a:t>
-            </a:r>
-            <a:r>
-              <a:rPr lang="en-US" dirty="0">
-                <a:hlinkClick r:id="rId14" tooltip="Statistics"/>
-              </a:rPr>
-              <a:t>statistics</a:t>
+              <a:t>Neumann architecture, linear programming, self-replicating machines, stochastic computing), and statistics</a:t>
             </a:r>
             <a:r>
               <a:rPr lang="en-US" dirty="0" smtClean="0"/>
@@ -14535,37 +14426,11 @@
             </a:r>
             <a:r>
               <a:rPr lang="en-US" dirty="0"/>
-              <a:t>principal member of the </a:t>
-            </a:r>
-            <a:r>
-              <a:rPr lang="en-US" dirty="0">
-                <a:hlinkClick r:id="rId15" tooltip="Manhattan Project"/>
-              </a:rPr>
-              <a:t>Manhattan Project</a:t>
-            </a:r>
-            <a:r>
-              <a:rPr lang="en-US" dirty="0"/>
-              <a:t> and the </a:t>
-            </a:r>
-            <a:r>
-              <a:rPr lang="en-US" dirty="0">
-                <a:hlinkClick r:id="rId16" tooltip="Institute for Advanced Study"/>
-              </a:rPr>
-              <a:t>Institute for Advanced Study</a:t>
-            </a:r>
-            <a:r>
-              <a:rPr lang="en-US" dirty="0"/>
-              <a:t> in </a:t>
-            </a:r>
-            <a:r>
-              <a:rPr lang="en-US" dirty="0" smtClean="0">
-                <a:hlinkClick r:id="rId17" tooltip="Princeton, New Jersey"/>
-              </a:rPr>
-              <a:t>Princeton</a:t>
+              <a:t>principal member of the Manhattan Project and the Institute for Advanced Study in </a:t>
             </a:r>
             <a:r>
               <a:rPr lang="en-US" dirty="0" smtClean="0"/>
-              <a:t>.</a:t>
+              <a:t>Princeton.</a:t>
             </a:r>
             <a:endParaRPr lang="he-IL" dirty="0"/>
           </a:p>
@@ -14609,7 +14474,7 @@
           <p:nvPr/>
         </p:nvPicPr>
         <p:blipFill>
-          <a:blip r:embed="rId18">
+          <a:blip r:embed="rId2">
             <a:extLst>
               <a:ext uri="{28A0092B-C50C-407E-A947-70E740481C1C}">
                 <a14:useLocalDpi xmlns:a14="http://schemas.microsoft.com/office/drawing/2010/main" val="0"/>

</xml_diff>